<commit_message>
second commit, backup before doing some changes
</commit_message>
<xml_diff>
--- a/1.Design_HR_DB_Pgresql/Mateus_Presentation_HRSystem.pptx
+++ b/1.Design_HR_DB_Pgresql/Mateus_Presentation_HRSystem.pptx
@@ -27279,10 +27279,10 @@
       </p:sp>
       <p:pic>
         <p:nvPicPr>
-          <p:cNvPr id="3" name="Picture 2">
+          <p:cNvPr id="2" name="Picture 1">
             <a:extLst>
               <a:ext uri="{FF2B5EF4-FFF2-40B4-BE49-F238E27FC236}">
-                <a16:creationId xmlns:a16="http://schemas.microsoft.com/office/drawing/2014/main" id="{1A6C1C35-0AE7-3644-8373-44B0FEDF05BB}"/>
+                <a16:creationId xmlns:a16="http://schemas.microsoft.com/office/drawing/2014/main" id="{1ADC504F-D06C-B045-BF4C-54208366DF14}"/>
               </a:ext>
             </a:extLst>
           </p:cNvPr>
@@ -27299,8 +27299,8 @@
         </p:blipFill>
         <p:spPr>
           <a:xfrm>
-            <a:off x="0" y="3380568"/>
-            <a:ext cx="7772400" cy="3886200"/>
+            <a:off x="192250" y="3687624"/>
+            <a:ext cx="7315200" cy="4864100"/>
           </a:xfrm>
           <a:prstGeom prst="rect">
             <a:avLst/>
@@ -27344,7 +27344,7 @@
         </p:nvSpPr>
         <p:spPr>
           <a:xfrm>
-            <a:off x="264945" y="870271"/>
+            <a:off x="264945" y="56874"/>
             <a:ext cx="7242600" cy="1119900"/>
           </a:xfrm>
           <a:prstGeom prst="rect">
@@ -27367,10 +27367,10 @@
               <a:buNone/>
             </a:pPr>
             <a:r>
-              <a:rPr lang="en"/>
+              <a:rPr lang="en" dirty="0"/>
               <a:t>ERD</a:t>
             </a:r>
-            <a:endParaRPr/>
+            <a:endParaRPr dirty="0"/>
           </a:p>
         </p:txBody>
       </p:sp>
@@ -27386,7 +27386,7 @@
         </p:nvSpPr>
         <p:spPr>
           <a:xfrm>
-            <a:off x="264950" y="2253724"/>
+            <a:off x="355600" y="1163250"/>
             <a:ext cx="7242600" cy="7731900"/>
           </a:xfrm>
           <a:prstGeom prst="rect">
@@ -27490,10 +27490,10 @@
       </p:sp>
       <p:pic>
         <p:nvPicPr>
-          <p:cNvPr id="3" name="Picture 2">
+          <p:cNvPr id="2" name="Picture 1">
             <a:extLst>
               <a:ext uri="{FF2B5EF4-FFF2-40B4-BE49-F238E27FC236}">
-                <a16:creationId xmlns:a16="http://schemas.microsoft.com/office/drawing/2014/main" id="{2E672726-095F-B34D-ADD0-0BE4CDACF477}"/>
+                <a16:creationId xmlns:a16="http://schemas.microsoft.com/office/drawing/2014/main" id="{3497F182-5D9A-AE49-BA3F-131B26431110}"/>
               </a:ext>
             </a:extLst>
           </p:cNvPr>
@@ -27510,8 +27510,8 @@
         </p:blipFill>
         <p:spPr>
           <a:xfrm>
-            <a:off x="0" y="3266144"/>
-            <a:ext cx="7772400" cy="6129827"/>
+            <a:off x="0" y="1657626"/>
+            <a:ext cx="7416800" cy="8343900"/>
           </a:xfrm>
           <a:prstGeom prst="rect">
             <a:avLst/>
@@ -27555,7 +27555,7 @@
         </p:nvSpPr>
         <p:spPr>
           <a:xfrm>
-            <a:off x="264945" y="870271"/>
+            <a:off x="264900" y="310321"/>
             <a:ext cx="7242600" cy="1119900"/>
           </a:xfrm>
           <a:prstGeom prst="rect">
@@ -27578,10 +27578,10 @@
               <a:buNone/>
             </a:pPr>
             <a:r>
-              <a:rPr lang="en"/>
+              <a:rPr lang="en" dirty="0"/>
               <a:t>ERD</a:t>
             </a:r>
-            <a:endParaRPr/>
+            <a:endParaRPr dirty="0"/>
           </a:p>
         </p:txBody>
       </p:sp>
@@ -27597,7 +27597,7 @@
         </p:nvSpPr>
         <p:spPr>
           <a:xfrm>
-            <a:off x="188928" y="2238143"/>
+            <a:off x="111436" y="1430221"/>
             <a:ext cx="7242600" cy="7731900"/>
           </a:xfrm>
           <a:prstGeom prst="rect">
@@ -27664,10 +27664,10 @@
       </p:sp>
       <p:pic>
         <p:nvPicPr>
-          <p:cNvPr id="3" name="Picture 2">
+          <p:cNvPr id="4" name="Picture 3">
             <a:extLst>
               <a:ext uri="{FF2B5EF4-FFF2-40B4-BE49-F238E27FC236}">
-                <a16:creationId xmlns:a16="http://schemas.microsoft.com/office/drawing/2014/main" id="{0A3086CA-DEFB-7F45-AA0F-8F22F0E30FB2}"/>
+                <a16:creationId xmlns:a16="http://schemas.microsoft.com/office/drawing/2014/main" id="{813071CB-C097-CB4E-B72A-4BCCC94BE257}"/>
               </a:ext>
             </a:extLst>
           </p:cNvPr>
@@ -27684,8 +27684,8 @@
         </p:blipFill>
         <p:spPr>
           <a:xfrm>
-            <a:off x="0" y="3106749"/>
-            <a:ext cx="7772400" cy="6386623"/>
+            <a:off x="264900" y="1868231"/>
+            <a:ext cx="6911535" cy="8190169"/>
           </a:xfrm>
           <a:prstGeom prst="rect">
             <a:avLst/>
@@ -32518,7 +32518,7 @@
             </a:r>
             <a:r>
               <a:rPr lang="en-US" sz="1700" dirty="0"/>
-              <a:t>The purpose is having a better process to manage the employees of the company, since the company is growing and managing this info in a spreadsheet is far from a good practice.</a:t>
+              <a:t>The purpose is having a better process to manage the information on the employees of the company.</a:t>
             </a:r>
             <a:endParaRPr sz="1700" dirty="0"/>
           </a:p>
@@ -32743,41 +32743,26 @@
               <a:rPr lang="en-US" sz="1700" dirty="0"/>
               <a:t>HR Managers can have access to their own Organization</a:t>
             </a:r>
-          </a:p>
-          <a:p>
-            <a:pPr marL="457200" lvl="0" indent="0" algn="l" rtl="0">
-              <a:lnSpc>
-                <a:spcPct val="100000"/>
-              </a:lnSpc>
-              <a:spcBef>
-                <a:spcPts val="1600"/>
-              </a:spcBef>
-              <a:spcAft>
-                <a:spcPts val="0"/>
-              </a:spcAft>
-              <a:buNone/>
-            </a:pPr>
+            <a:br>
+              <a:rPr lang="en-US" sz="1700" dirty="0"/>
+            </a:br>
             <a:r>
               <a:rPr lang="en-US" sz="1700" dirty="0"/>
               <a:t>HR Admins can have access to the whole database</a:t>
             </a:r>
-          </a:p>
-          <a:p>
-            <a:pPr marL="457200" lvl="0" indent="0" algn="l" rtl="0">
-              <a:lnSpc>
-                <a:spcPct val="100000"/>
-              </a:lnSpc>
-              <a:spcBef>
-                <a:spcPts val="1600"/>
-              </a:spcBef>
-              <a:spcAft>
-                <a:spcPts val="0"/>
-              </a:spcAft>
-              <a:buNone/>
-            </a:pPr>
+            <a:br>
+              <a:rPr lang="en-US" sz="1700" dirty="0"/>
+            </a:br>
             <a:r>
               <a:rPr lang="en-US" sz="1700" dirty="0"/>
               <a:t>Business Partners with Admin access can access the whole db.</a:t>
+            </a:r>
+            <a:br>
+              <a:rPr lang="en-US" sz="1700" dirty="0"/>
+            </a:br>
+            <a:r>
+              <a:rPr lang="en-US" sz="1700" dirty="0"/>
+              <a:t>Employees with domain login have “Read” access, they shouldn’t be able to see the salaries though.</a:t>
             </a:r>
             <a:endParaRPr sz="1900" dirty="0"/>
           </a:p>
@@ -32946,29 +32931,9 @@
             </a:pPr>
             <a:r>
               <a:rPr lang="en-US" sz="1700" dirty="0"/>
-              <a:t>The database will have around 7 tables, starting with about 200 </a:t>
+              <a:t>The database will have around 8 tables, it’s starting with 206 records, the database should be less than 1gb for the next year, but if more than 10k rows is expected by the next year, then more space should be asked for IT.</a:t>
             </a:r>
-            <a:r>
-              <a:rPr lang="en-US" sz="1700" dirty="0" err="1"/>
-              <a:t>emplooyes</a:t>
-            </a:r>
-            <a:r>
-              <a:rPr lang="en-US" sz="1700" dirty="0"/>
-              <a:t>, since we’ll have a historical table where one employee can appear more than one time, let’s say we’ll start with 400 rows, with the potential in a year or two to grow about 200% - no concerns about this part, the number of rows is pretty small.</a:t>
-            </a:r>
-            <a:endParaRPr sz="1900" dirty="0"/>
-          </a:p>
-          <a:p>
-            <a:pPr marL="0" lvl="0" indent="0" algn="l" rtl="0">
-              <a:spcBef>
-                <a:spcPts val="0"/>
-              </a:spcBef>
-              <a:spcAft>
-                <a:spcPts val="0"/>
-              </a:spcAft>
-              <a:buNone/>
-            </a:pPr>
-            <a:endParaRPr sz="1900" dirty="0"/>
+            <a:endParaRPr sz="1700" dirty="0"/>
           </a:p>
           <a:p>
             <a:pPr marL="457200" lvl="0" indent="-349250" algn="l" rtl="0">
@@ -33013,17 +32978,11 @@
             </a:pPr>
             <a:r>
               <a:rPr lang="en-US" sz="1700" dirty="0">
-                <a:latin typeface="Open Sans"/>
-                <a:ea typeface="Open Sans"/>
-                <a:cs typeface="Open Sans"/>
                 <a:sym typeface="Open Sans"/>
               </a:rPr>
-              <a:t>The maximum estimated growth by year should be 100%.</a:t>
+              <a:t>The database has grown from 10 to 206 records in the past year (20 times). If in the next year it grows as much as this past year then we should have around 5k rows.</a:t>
             </a:r>
-            <a:endParaRPr sz="1900" dirty="0">
-              <a:latin typeface="Open Sans"/>
-              <a:ea typeface="Open Sans"/>
-              <a:cs typeface="Open Sans"/>
+            <a:endParaRPr sz="1700" dirty="0">
               <a:sym typeface="Open Sans"/>
             </a:endParaRPr>
           </a:p>
@@ -33087,28 +33046,8 @@
             </a:pPr>
             <a:r>
               <a:rPr lang="en-US" sz="1700" dirty="0"/>
-              <a:t>We have PII data (name, email, salary), </a:t>
+              <a:t>We have PII data (name, email, salary), for the business salary is the most critical attribute.</a:t>
             </a:r>
-            <a:r>
-              <a:rPr lang="en-US" sz="1700" dirty="0" err="1"/>
-              <a:t>gotta</a:t>
-            </a:r>
-            <a:r>
-              <a:rPr lang="en-US" sz="1700" dirty="0"/>
-              <a:t> be careful with it.</a:t>
-            </a:r>
-            <a:endParaRPr sz="1900" dirty="0"/>
-          </a:p>
-          <a:p>
-            <a:pPr marL="0" lvl="0" indent="0" algn="l" rtl="0">
-              <a:spcBef>
-                <a:spcPts val="0"/>
-              </a:spcBef>
-              <a:spcAft>
-                <a:spcPts val="0"/>
-              </a:spcAft>
-              <a:buNone/>
-            </a:pPr>
             <a:endParaRPr sz="1900" b="1" dirty="0">
               <a:latin typeface="Open Sans"/>
               <a:ea typeface="Open Sans"/>
@@ -33159,7 +33098,7 @@
             </a:pPr>
             <a:r>
               <a:rPr lang="en-US" sz="1700" dirty="0"/>
-              <a:t>Data will be retained permanently.</a:t>
+              <a:t>Data will be retained for 7 years due to Govts’ law.</a:t>
             </a:r>
           </a:p>
           <a:p>
@@ -33354,18 +33293,6 @@
               <a:rPr lang="en-US" sz="1700" dirty="0"/>
               <a:t>With the SQL DB we can have data stored in an efficient way, in a way that will work in the short, medium, and long term – improves scalability</a:t>
             </a:r>
-            <a:endParaRPr sz="1900" dirty="0"/>
-          </a:p>
-          <a:p>
-            <a:pPr marL="0" lvl="0" indent="0" algn="l" rtl="0">
-              <a:spcBef>
-                <a:spcPts val="0"/>
-              </a:spcBef>
-              <a:spcAft>
-                <a:spcPts val="0"/>
-              </a:spcAft>
-              <a:buNone/>
-            </a:pPr>
             <a:endParaRPr sz="1900" dirty="0"/>
           </a:p>
           <a:p>
@@ -33581,7 +33508,7 @@
             </a:pPr>
             <a:r>
               <a:rPr lang="en" sz="1700" dirty="0"/>
-              <a:t>We’ll use a stored procedure with SQL queries to create the tables, and to insert the data from staging into our 3NF model.</a:t>
+              <a:t>ETL - We’ll use a stored procedure with SQL queries to create the tables, and to insert the data from staging into our 3NF model.</a:t>
             </a:r>
             <a:endParaRPr sz="1900" dirty="0"/>
           </a:p>
@@ -33624,7 +33551,7 @@
         </p:nvSpPr>
         <p:spPr>
           <a:xfrm>
-            <a:off x="264945" y="870271"/>
+            <a:off x="264900" y="312332"/>
             <a:ext cx="7242600" cy="1119900"/>
           </a:xfrm>
           <a:prstGeom prst="rect">
@@ -33666,7 +33593,7 @@
         </p:nvSpPr>
         <p:spPr>
           <a:xfrm>
-            <a:off x="264950" y="2253724"/>
+            <a:off x="264900" y="1706568"/>
             <a:ext cx="7242600" cy="7731900"/>
           </a:xfrm>
           <a:prstGeom prst="rect">
@@ -33844,23 +33771,27 @@
             </a:endParaRPr>
           </a:p>
           <a:p>
-            <a:pPr marL="457200" lvl="0" indent="0" algn="l" rtl="0">
-              <a:spcBef>
-                <a:spcPts val="1600"/>
-              </a:spcBef>
-              <a:spcAft>
-                <a:spcPts val="0"/>
-              </a:spcAft>
+            <a:pPr indent="0">
+              <a:lnSpc>
+                <a:spcPct val="100000"/>
+              </a:lnSpc>
               <a:buNone/>
             </a:pPr>
             <a:r>
-              <a:rPr lang="en" sz="1900" dirty="0"/>
-              <a:t>List at least 2 examples of considerations taken to ensure data scalability and flexibility, and provide an explanation</a:t>
+              <a:rPr lang="en-US" sz="1900" b="1" dirty="0"/>
+              <a:t>Scalability</a:t>
             </a:r>
-            <a:endParaRPr sz="1900" dirty="0"/>
+            <a:r>
+              <a:rPr lang="en-US" sz="1900" dirty="0"/>
+              <a:t>: </a:t>
+            </a:r>
+            <a:r>
+              <a:rPr lang="en-US" sz="1700" dirty="0"/>
+              <a:t>We have a read intensive model to built, with that we can think about using read-replicas. </a:t>
+            </a:r>
           </a:p>
           <a:p>
-            <a:pPr marL="0" lvl="0" indent="0" algn="l" rtl="0">
+            <a:pPr marL="457200" lvl="0" indent="0" algn="l" rtl="0">
               <a:spcBef>
                 <a:spcPts val="1600"/>
               </a:spcBef>
@@ -33869,7 +33800,19 @@
               </a:spcAft>
               <a:buNone/>
             </a:pPr>
-            <a:endParaRPr sz="1900" dirty="0"/>
+            <a:r>
+              <a:rPr lang="en-US" sz="1900" b="1" dirty="0"/>
+              <a:t>Flexibility</a:t>
+            </a:r>
+            <a:r>
+              <a:rPr lang="en-US" sz="1900" dirty="0"/>
+              <a:t>: </a:t>
+            </a:r>
+            <a:r>
+              <a:rPr lang="en-US" sz="1700" dirty="0"/>
+              <a:t>Having normalized tables will help us to be able to add new entities as needed later on.</a:t>
+            </a:r>
+            <a:endParaRPr sz="1700" dirty="0"/>
           </a:p>
           <a:p>
             <a:pPr marL="457200" lvl="0" indent="-349250" algn="l" rtl="0">
@@ -33923,7 +33866,15 @@
             </a:r>
             <a:r>
               <a:rPr lang="en" sz="1700" dirty="0"/>
-              <a:t>Data will be stored in Disk.</a:t>
+              <a:t>Data will be stored in Spinning Disk, in 1gb partition reserved spaces. If there is a forecast to have more than 10k rows of data in the next year, than more space should be asked to IT. Disk will be fast enough for our case to supply the </a:t>
+            </a:r>
+            <a:r>
+              <a:rPr lang="en" sz="1700" dirty="0" err="1"/>
+              <a:t>neede</a:t>
+            </a:r>
+            <a:r>
+              <a:rPr lang="en" sz="1700" dirty="0"/>
+              <a:t> computation for our reads and writes workload.</a:t>
             </a:r>
             <a:endParaRPr sz="1700" dirty="0"/>
           </a:p>
@@ -33966,23 +33917,8 @@
             </a:r>
             <a:r>
               <a:rPr lang="en-US" sz="1700" dirty="0"/>
-              <a:t>Indefinitely, there’s no need to erase the data since it’s not a huge amount of information that we’ll be storing.</a:t>
+              <a:t>7 Years at least due to Govts’ Law.</a:t>
             </a:r>
-            <a:endParaRPr sz="1700" dirty="0"/>
-          </a:p>
-          <a:p>
-            <a:pPr marL="457200" lvl="0" indent="0" algn="l" rtl="0">
-              <a:lnSpc>
-                <a:spcPct val="100000"/>
-              </a:lnSpc>
-              <a:spcBef>
-                <a:spcPts val="0"/>
-              </a:spcBef>
-              <a:spcAft>
-                <a:spcPts val="0"/>
-              </a:spcAft>
-              <a:buNone/>
-            </a:pPr>
             <a:endParaRPr sz="1700" dirty="0"/>
           </a:p>
           <a:p>
@@ -34040,7 +33976,7 @@
             </a:pPr>
             <a:r>
               <a:rPr lang="en-US" sz="1700" dirty="0"/>
-              <a:t>Weekly backups with Daily incremental backups.</a:t>
+              <a:t>Weekly backups with Daily incremental backups. The data is critical, that’s why we are planning this backup strategy.</a:t>
             </a:r>
             <a:endParaRPr sz="1700" dirty="0"/>
           </a:p>

</xml_diff>